<commit_message>
added assumptions to ppt
</commit_message>
<xml_diff>
--- a/Ovia Health App.pptx
+++ b/Ovia Health App.pptx
@@ -7,12 +7,13 @@
   <p:sldIdLst>
     <p:sldId id="258" r:id="rId2"/>
     <p:sldId id="256" r:id="rId3"/>
-    <p:sldId id="257" r:id="rId4"/>
-    <p:sldId id="259" r:id="rId5"/>
-    <p:sldId id="263" r:id="rId6"/>
-    <p:sldId id="260" r:id="rId7"/>
-    <p:sldId id="261" r:id="rId8"/>
-    <p:sldId id="262" r:id="rId9"/>
+    <p:sldId id="264" r:id="rId4"/>
+    <p:sldId id="257" r:id="rId5"/>
+    <p:sldId id="259" r:id="rId6"/>
+    <p:sldId id="263" r:id="rId7"/>
+    <p:sldId id="260" r:id="rId8"/>
+    <p:sldId id="261" r:id="rId9"/>
+    <p:sldId id="262" r:id="rId10"/>
   </p:sldIdLst>
   <p:sldSz cx="12192000" cy="6858000"/>
   <p:notesSz cx="6858000" cy="9144000"/>
@@ -111,6 +112,11 @@
       </a:defRPr>
     </a:lvl9pPr>
   </p:defaultTextStyle>
+  <p:extLst>
+    <p:ext uri="{EFAFB233-063F-42B5-8137-9DF3F51BA10A}">
+      <p15:sldGuideLst xmlns:p15="http://schemas.microsoft.com/office/powerpoint/2012/main"/>
+    </p:ext>
+  </p:extLst>
 </p:presentation>
 </file>
 
@@ -836,7 +842,7 @@
           <a:p>
             <a:fld id="{FD59D71B-FA35-45D5-8044-E80E7E5BBDCD}" type="datetimeFigureOut">
               <a:rPr lang="en-US" smtClean="0"/>
-              <a:t>7/23/2021</a:t>
+              <a:t>7/24/2021</a:t>
             </a:fld>
             <a:endParaRPr lang="en-US"/>
           </a:p>
@@ -1087,7 +1093,7 @@
           <a:p>
             <a:fld id="{FD59D71B-FA35-45D5-8044-E80E7E5BBDCD}" type="datetimeFigureOut">
               <a:rPr lang="en-US" smtClean="0"/>
-              <a:t>7/23/2021</a:t>
+              <a:t>7/24/2021</a:t>
             </a:fld>
             <a:endParaRPr lang="en-US"/>
           </a:p>
@@ -1401,7 +1407,7 @@
           <a:p>
             <a:fld id="{FD59D71B-FA35-45D5-8044-E80E7E5BBDCD}" type="datetimeFigureOut">
               <a:rPr lang="en-US" smtClean="0"/>
-              <a:t>7/23/2021</a:t>
+              <a:t>7/24/2021</a:t>
             </a:fld>
             <a:endParaRPr lang="en-US"/>
           </a:p>
@@ -1742,7 +1748,7 @@
           <a:p>
             <a:fld id="{FD59D71B-FA35-45D5-8044-E80E7E5BBDCD}" type="datetimeFigureOut">
               <a:rPr lang="en-US" smtClean="0"/>
-              <a:t>7/23/2021</a:t>
+              <a:t>7/24/2021</a:t>
             </a:fld>
             <a:endParaRPr lang="en-US"/>
           </a:p>
@@ -2056,7 +2062,7 @@
           <a:p>
             <a:fld id="{FD59D71B-FA35-45D5-8044-E80E7E5BBDCD}" type="datetimeFigureOut">
               <a:rPr lang="en-US" smtClean="0"/>
-              <a:t>7/23/2021</a:t>
+              <a:t>7/24/2021</a:t>
             </a:fld>
             <a:endParaRPr lang="en-US"/>
           </a:p>
@@ -2449,7 +2455,7 @@
           <a:p>
             <a:fld id="{FD59D71B-FA35-45D5-8044-E80E7E5BBDCD}" type="datetimeFigureOut">
               <a:rPr lang="en-US" smtClean="0"/>
-              <a:t>7/23/2021</a:t>
+              <a:t>7/24/2021</a:t>
             </a:fld>
             <a:endParaRPr lang="en-US"/>
           </a:p>
@@ -2619,7 +2625,7 @@
           <a:p>
             <a:fld id="{FD59D71B-FA35-45D5-8044-E80E7E5BBDCD}" type="datetimeFigureOut">
               <a:rPr lang="en-US" smtClean="0"/>
-              <a:t>7/23/2021</a:t>
+              <a:t>7/24/2021</a:t>
             </a:fld>
             <a:endParaRPr lang="en-US"/>
           </a:p>
@@ -2799,7 +2805,7 @@
           <a:p>
             <a:fld id="{FD59D71B-FA35-45D5-8044-E80E7E5BBDCD}" type="datetimeFigureOut">
               <a:rPr lang="en-US" smtClean="0"/>
-              <a:t>7/23/2021</a:t>
+              <a:t>7/24/2021</a:t>
             </a:fld>
             <a:endParaRPr lang="en-US"/>
           </a:p>
@@ -2975,7 +2981,7 @@
           <a:p>
             <a:fld id="{FD59D71B-FA35-45D5-8044-E80E7E5BBDCD}" type="datetimeFigureOut">
               <a:rPr lang="en-US" smtClean="0"/>
-              <a:t>7/23/2021</a:t>
+              <a:t>7/24/2021</a:t>
             </a:fld>
             <a:endParaRPr lang="en-US"/>
           </a:p>
@@ -3222,7 +3228,7 @@
           <a:p>
             <a:fld id="{FD59D71B-FA35-45D5-8044-E80E7E5BBDCD}" type="datetimeFigureOut">
               <a:rPr lang="en-US" smtClean="0"/>
-              <a:t>7/23/2021</a:t>
+              <a:t>7/24/2021</a:t>
             </a:fld>
             <a:endParaRPr lang="en-US"/>
           </a:p>
@@ -3454,7 +3460,7 @@
           <a:p>
             <a:fld id="{FD59D71B-FA35-45D5-8044-E80E7E5BBDCD}" type="datetimeFigureOut">
               <a:rPr lang="en-US" smtClean="0"/>
-              <a:t>7/23/2021</a:t>
+              <a:t>7/24/2021</a:t>
             </a:fld>
             <a:endParaRPr lang="en-US"/>
           </a:p>
@@ -3828,7 +3834,7 @@
           <a:p>
             <a:fld id="{FD59D71B-FA35-45D5-8044-E80E7E5BBDCD}" type="datetimeFigureOut">
               <a:rPr lang="en-US" smtClean="0"/>
-              <a:t>7/23/2021</a:t>
+              <a:t>7/24/2021</a:t>
             </a:fld>
             <a:endParaRPr lang="en-US"/>
           </a:p>
@@ -3951,7 +3957,7 @@
           <a:p>
             <a:fld id="{FD59D71B-FA35-45D5-8044-E80E7E5BBDCD}" type="datetimeFigureOut">
               <a:rPr lang="en-US" smtClean="0"/>
-              <a:t>7/23/2021</a:t>
+              <a:t>7/24/2021</a:t>
             </a:fld>
             <a:endParaRPr lang="en-US"/>
           </a:p>
@@ -4046,7 +4052,7 @@
           <a:p>
             <a:fld id="{FD59D71B-FA35-45D5-8044-E80E7E5BBDCD}" type="datetimeFigureOut">
               <a:rPr lang="en-US" smtClean="0"/>
-              <a:t>7/23/2021</a:t>
+              <a:t>7/24/2021</a:t>
             </a:fld>
             <a:endParaRPr lang="en-US"/>
           </a:p>
@@ -4301,7 +4307,7 @@
           <a:p>
             <a:fld id="{FD59D71B-FA35-45D5-8044-E80E7E5BBDCD}" type="datetimeFigureOut">
               <a:rPr lang="en-US" smtClean="0"/>
-              <a:t>7/23/2021</a:t>
+              <a:t>7/24/2021</a:t>
             </a:fld>
             <a:endParaRPr lang="en-US"/>
           </a:p>
@@ -4564,7 +4570,7 @@
           <a:p>
             <a:fld id="{FD59D71B-FA35-45D5-8044-E80E7E5BBDCD}" type="datetimeFigureOut">
               <a:rPr lang="en-US" smtClean="0"/>
-              <a:t>7/23/2021</a:t>
+              <a:t>7/24/2021</a:t>
             </a:fld>
             <a:endParaRPr lang="en-US"/>
           </a:p>
@@ -5307,7 +5313,7 @@
           <a:p>
             <a:fld id="{FD59D71B-FA35-45D5-8044-E80E7E5BBDCD}" type="datetimeFigureOut">
               <a:rPr lang="en-US" smtClean="0"/>
-              <a:t>7/23/2021</a:t>
+              <a:t>7/24/2021</a:t>
             </a:fld>
             <a:endParaRPr lang="en-US"/>
           </a:p>
@@ -6494,7 +6500,7 @@
         </p:nvSpPr>
         <p:spPr>
           <a:xfrm>
-            <a:off x="779299" y="5788468"/>
+            <a:off x="653111" y="5788468"/>
             <a:ext cx="1403526" cy="369332"/>
           </a:xfrm>
           <a:prstGeom prst="rect">
@@ -6589,6 +6595,84 @@
                 </a:effectLst>
               </a:rPr>
               <a:t>endpoint</a:t>
+            </a:r>
+          </a:p>
+        </p:txBody>
+      </p:sp>
+      <p:sp>
+        <p:nvSpPr>
+          <p:cNvPr id="2" name="TextBox 1">
+            <a:extLst>
+              <a:ext uri="{FF2B5EF4-FFF2-40B4-BE49-F238E27FC236}">
+                <a16:creationId xmlns:a16="http://schemas.microsoft.com/office/drawing/2014/main" id="{553A267D-4E9B-427F-A289-698ED32DD35A}"/>
+              </a:ext>
+            </a:extLst>
+          </p:cNvPr>
+          <p:cNvSpPr txBox="1"/>
+          <p:nvPr/>
+        </p:nvSpPr>
+        <p:spPr>
+          <a:xfrm>
+            <a:off x="536978" y="1683087"/>
+            <a:ext cx="2138727" cy="276999"/>
+          </a:xfrm>
+          <a:prstGeom prst="rect">
+            <a:avLst/>
+          </a:prstGeom>
+          <a:noFill/>
+        </p:spPr>
+        <p:txBody>
+          <a:bodyPr wrap="none" rtlCol="0">
+            <a:spAutoFit/>
+          </a:bodyPr>
+          <a:lstStyle/>
+          <a:p>
+            <a:r>
+              <a:rPr lang="en-US" sz="1200" dirty="0"/>
+              <a:t>https:\\ovia-health.com\</a:t>
+            </a:r>
+            <a:r>
+              <a:rPr lang="en-US" sz="1200" dirty="0" err="1"/>
+              <a:t>api</a:t>
+            </a:r>
+            <a:r>
+              <a:rPr lang="en-US" sz="1200" dirty="0"/>
+              <a:t>\</a:t>
+            </a:r>
+          </a:p>
+        </p:txBody>
+      </p:sp>
+      <p:sp>
+        <p:nvSpPr>
+          <p:cNvPr id="18" name="TextBox 17">
+            <a:extLst>
+              <a:ext uri="{FF2B5EF4-FFF2-40B4-BE49-F238E27FC236}">
+                <a16:creationId xmlns:a16="http://schemas.microsoft.com/office/drawing/2014/main" id="{917A90C2-D666-45B3-B74D-47B7F1C47FEB}"/>
+              </a:ext>
+            </a:extLst>
+          </p:cNvPr>
+          <p:cNvSpPr txBox="1"/>
+          <p:nvPr/>
+        </p:nvSpPr>
+        <p:spPr>
+          <a:xfrm>
+            <a:off x="6139" y="5611332"/>
+            <a:ext cx="2949846" cy="276999"/>
+          </a:xfrm>
+          <a:prstGeom prst="rect">
+            <a:avLst/>
+          </a:prstGeom>
+          <a:noFill/>
+        </p:spPr>
+        <p:txBody>
+          <a:bodyPr wrap="none" rtlCol="0">
+            <a:spAutoFit/>
+          </a:bodyPr>
+          <a:lstStyle/>
+          <a:p>
+            <a:r>
+              <a:rPr lang="en-US" sz="1200" dirty="0"/>
+              <a:t>?date=2021-07-20&amp;incentivize-actions=1</a:t>
             </a:r>
           </a:p>
         </p:txBody>
@@ -6628,7 +6712,7 @@
           <p:cNvPr id="2" name="Title 1">
             <a:extLst>
               <a:ext uri="{FF2B5EF4-FFF2-40B4-BE49-F238E27FC236}">
-                <a16:creationId xmlns:a16="http://schemas.microsoft.com/office/drawing/2014/main" id="{D72DD27D-B9F9-44A2-BA02-621D290D8AD0}"/>
+                <a16:creationId xmlns:a16="http://schemas.microsoft.com/office/drawing/2014/main" id="{81CDA764-4564-4F97-A3A3-6795008D2167}"/>
               </a:ext>
             </a:extLst>
           </p:cNvPr>
@@ -6646,7 +6730,7 @@
           <a:p>
             <a:r>
               <a:rPr lang="en-US" dirty="0"/>
-              <a:t>Requirements</a:t>
+              <a:t>Assumptions</a:t>
             </a:r>
           </a:p>
         </p:txBody>
@@ -6656,7 +6740,7 @@
           <p:cNvPr id="3" name="Content Placeholder 2">
             <a:extLst>
               <a:ext uri="{FF2B5EF4-FFF2-40B4-BE49-F238E27FC236}">
-                <a16:creationId xmlns:a16="http://schemas.microsoft.com/office/drawing/2014/main" id="{F201CF1D-43D5-46B0-85BA-E6978CF6AED3}"/>
+                <a16:creationId xmlns:a16="http://schemas.microsoft.com/office/drawing/2014/main" id="{4BE1A8B5-D88A-4C15-B816-500A66A01726}"/>
               </a:ext>
             </a:extLst>
           </p:cNvPr>
@@ -6669,40 +6753,67 @@
         </p:nvSpPr>
         <p:spPr/>
         <p:txBody>
-          <a:bodyPr/>
+          <a:bodyPr>
+            <a:normAutofit lnSpcReduction="10000"/>
+          </a:bodyPr>
           <a:lstStyle/>
           <a:p>
             <a:r>
               <a:rPr lang="en-US" dirty="0"/>
-              <a:t>Support different types of incentive events </a:t>
-            </a:r>
-          </a:p>
-          <a:p>
-            <a:pPr lvl="1"/>
+              <a:t>Assuming we have cross-platform compatible or native in place that submit log at specific end point e.g. https:\\ovia-health.com\</a:t>
+            </a:r>
+            <a:r>
+              <a:rPr lang="en-US" dirty="0" err="1"/>
+              <a:t>api</a:t>
+            </a:r>
             <a:r>
               <a:rPr lang="en-US" dirty="0"/>
-              <a:t>User logged data five days in a row </a:t>
-            </a:r>
-          </a:p>
-          <a:p>
-            <a:pPr lvl="1"/>
+              <a:t>\</a:t>
+            </a:r>
+          </a:p>
+          <a:p>
             <a:r>
               <a:rPr lang="en-US" dirty="0"/>
-              <a:t>User reported a birth</a:t>
-            </a:r>
-          </a:p>
-          <a:p>
+              <a:t>In order to avoid any negative impact on user-experience, we can have front-end framework makes async call to submit user’s data. In this scenario, we have used following </a:t>
+            </a:r>
+            <a:r>
+              <a:rPr lang="en-US" dirty="0" err="1"/>
+              <a:t>url</a:t>
+            </a:r>
             <a:r>
               <a:rPr lang="en-US" dirty="0"/>
-              <a:t>Identify and record when a user achieves a certain incentive</a:t>
-            </a:r>
+              <a:t> query e.g. ?date=2021-07-23&amp;incentivize-actions=1</a:t>
+            </a:r>
+          </a:p>
+          <a:p>
+            <a:r>
+              <a:rPr lang="en-US" dirty="0"/>
+              <a:t>In order to quickly test and validate, I am assuming single incremental call to trigger 5 consecutive day app usage-based incentive.</a:t>
+            </a:r>
+          </a:p>
+          <a:p>
+            <a:r>
+              <a:rPr lang="en-US" dirty="0"/>
+              <a:t>Also, assuming that we have continuous on-going incentive program, resetting counter to 0 once the incentive is being awarded.</a:t>
+            </a:r>
+          </a:p>
+          <a:p>
+            <a:r>
+              <a:rPr lang="en-US" dirty="0"/>
+              <a:t>All end-points communicate over secured TLS 1.2 encryption, and hosted app on routinely patched servers and performed periodic update the app to make the whole system work securely </a:t>
+            </a:r>
+            <a:r>
+              <a:rPr lang="en-US"/>
+              <a:t>and efficiently.</a:t>
+            </a:r>
+            <a:endParaRPr lang="en-US" dirty="0"/>
           </a:p>
         </p:txBody>
       </p:sp>
     </p:spTree>
     <p:extLst>
       <p:ext uri="{BB962C8B-B14F-4D97-AF65-F5344CB8AC3E}">
-        <p14:creationId xmlns:p14="http://schemas.microsoft.com/office/powerpoint/2010/main" val="507032805"/>
+        <p14:creationId xmlns:p14="http://schemas.microsoft.com/office/powerpoint/2010/main" val="1031616406"/>
       </p:ext>
     </p:extLst>
   </p:cSld>
@@ -6734,7 +6845,7 @@
           <p:cNvPr id="2" name="Title 1">
             <a:extLst>
               <a:ext uri="{FF2B5EF4-FFF2-40B4-BE49-F238E27FC236}">
-                <a16:creationId xmlns:a16="http://schemas.microsoft.com/office/drawing/2014/main" id="{425EE02C-FCD4-4A78-924A-295901E7ECF4}"/>
+                <a16:creationId xmlns:a16="http://schemas.microsoft.com/office/drawing/2014/main" id="{D72DD27D-B9F9-44A2-BA02-621D290D8AD0}"/>
               </a:ext>
             </a:extLst>
           </p:cNvPr>
@@ -6752,7 +6863,7 @@
           <a:p>
             <a:r>
               <a:rPr lang="en-US" dirty="0"/>
-              <a:t>Coding</a:t>
+              <a:t>Requirements</a:t>
             </a:r>
           </a:p>
         </p:txBody>
@@ -6762,7 +6873,7 @@
           <p:cNvPr id="3" name="Content Placeholder 2">
             <a:extLst>
               <a:ext uri="{FF2B5EF4-FFF2-40B4-BE49-F238E27FC236}">
-                <a16:creationId xmlns:a16="http://schemas.microsoft.com/office/drawing/2014/main" id="{88CFCFC9-6B9A-43FC-8F41-38975658ACF0}"/>
+                <a16:creationId xmlns:a16="http://schemas.microsoft.com/office/drawing/2014/main" id="{F201CF1D-43D5-46B0-85BA-E6978CF6AED3}"/>
               </a:ext>
             </a:extLst>
           </p:cNvPr>
@@ -6778,48 +6889,37 @@
           <a:bodyPr/>
           <a:lstStyle/>
           <a:p>
-            <a:pPr>
-              <a:buFontTx/>
-              <a:buChar char="-"/>
-            </a:pPr>
             <a:r>
               <a:rPr lang="en-US" dirty="0"/>
-              <a:t>User interface to log information</a:t>
-            </a:r>
-          </a:p>
-          <a:p>
-            <a:pPr>
-              <a:buFontTx/>
-              <a:buChar char="-"/>
-            </a:pPr>
+              <a:t>Support different types of incentive events </a:t>
+            </a:r>
+          </a:p>
+          <a:p>
+            <a:pPr lvl="1"/>
             <a:r>
               <a:rPr lang="en-US" dirty="0"/>
-              <a:t>API Implementation</a:t>
-            </a:r>
-          </a:p>
-          <a:p>
-            <a:pPr>
-              <a:buFontTx/>
-              <a:buChar char="-"/>
-            </a:pPr>
+              <a:t>User logged data five days in a row </a:t>
+            </a:r>
+          </a:p>
+          <a:p>
+            <a:pPr lvl="1"/>
             <a:r>
               <a:rPr lang="en-US" dirty="0"/>
-              <a:t>Status block to visualize data</a:t>
-            </a:r>
-          </a:p>
-          <a:p>
-            <a:pPr>
-              <a:buFontTx/>
-              <a:buChar char="-"/>
-            </a:pPr>
-            <a:endParaRPr lang="en-US" dirty="0"/>
+              <a:t>User reported a birth</a:t>
+            </a:r>
+          </a:p>
+          <a:p>
+            <a:r>
+              <a:rPr lang="en-US" dirty="0"/>
+              <a:t>Identify and record when a user achieves a certain incentive</a:t>
+            </a:r>
           </a:p>
         </p:txBody>
       </p:sp>
     </p:spTree>
     <p:extLst>
       <p:ext uri="{BB962C8B-B14F-4D97-AF65-F5344CB8AC3E}">
-        <p14:creationId xmlns:p14="http://schemas.microsoft.com/office/powerpoint/2010/main" val="3077260541"/>
+        <p14:creationId xmlns:p14="http://schemas.microsoft.com/office/powerpoint/2010/main" val="507032805"/>
       </p:ext>
     </p:extLst>
   </p:cSld>
@@ -6851,6 +6951,123 @@
           <p:cNvPr id="2" name="Title 1">
             <a:extLst>
               <a:ext uri="{FF2B5EF4-FFF2-40B4-BE49-F238E27FC236}">
+                <a16:creationId xmlns:a16="http://schemas.microsoft.com/office/drawing/2014/main" id="{425EE02C-FCD4-4A78-924A-295901E7ECF4}"/>
+              </a:ext>
+            </a:extLst>
+          </p:cNvPr>
+          <p:cNvSpPr>
+            <a:spLocks noGrp="1"/>
+          </p:cNvSpPr>
+          <p:nvPr>
+            <p:ph type="title"/>
+          </p:nvPr>
+        </p:nvSpPr>
+        <p:spPr/>
+        <p:txBody>
+          <a:bodyPr/>
+          <a:lstStyle/>
+          <a:p>
+            <a:r>
+              <a:rPr lang="en-US" dirty="0"/>
+              <a:t>Coding</a:t>
+            </a:r>
+          </a:p>
+        </p:txBody>
+      </p:sp>
+      <p:sp>
+        <p:nvSpPr>
+          <p:cNvPr id="3" name="Content Placeholder 2">
+            <a:extLst>
+              <a:ext uri="{FF2B5EF4-FFF2-40B4-BE49-F238E27FC236}">
+                <a16:creationId xmlns:a16="http://schemas.microsoft.com/office/drawing/2014/main" id="{88CFCFC9-6B9A-43FC-8F41-38975658ACF0}"/>
+              </a:ext>
+            </a:extLst>
+          </p:cNvPr>
+          <p:cNvSpPr>
+            <a:spLocks noGrp="1"/>
+          </p:cNvSpPr>
+          <p:nvPr>
+            <p:ph idx="1"/>
+          </p:nvPr>
+        </p:nvSpPr>
+        <p:spPr/>
+        <p:txBody>
+          <a:bodyPr/>
+          <a:lstStyle/>
+          <a:p>
+            <a:pPr>
+              <a:buFontTx/>
+              <a:buChar char="-"/>
+            </a:pPr>
+            <a:r>
+              <a:rPr lang="en-US" dirty="0"/>
+              <a:t>User interface to log information</a:t>
+            </a:r>
+          </a:p>
+          <a:p>
+            <a:pPr>
+              <a:buFontTx/>
+              <a:buChar char="-"/>
+            </a:pPr>
+            <a:r>
+              <a:rPr lang="en-US" dirty="0"/>
+              <a:t>API Implementation</a:t>
+            </a:r>
+          </a:p>
+          <a:p>
+            <a:pPr>
+              <a:buFontTx/>
+              <a:buChar char="-"/>
+            </a:pPr>
+            <a:r>
+              <a:rPr lang="en-US" dirty="0"/>
+              <a:t>Status block to visualize data</a:t>
+            </a:r>
+          </a:p>
+          <a:p>
+            <a:pPr>
+              <a:buFontTx/>
+              <a:buChar char="-"/>
+            </a:pPr>
+            <a:endParaRPr lang="en-US" dirty="0"/>
+          </a:p>
+        </p:txBody>
+      </p:sp>
+    </p:spTree>
+    <p:extLst>
+      <p:ext uri="{BB962C8B-B14F-4D97-AF65-F5344CB8AC3E}">
+        <p14:creationId xmlns:p14="http://schemas.microsoft.com/office/powerpoint/2010/main" val="3077260541"/>
+      </p:ext>
+    </p:extLst>
+  </p:cSld>
+  <p:clrMapOvr>
+    <a:masterClrMapping/>
+  </p:clrMapOvr>
+</p:sld>
+</file>
+
+<file path=ppt/slides/slide6.xml><?xml version="1.0" encoding="utf-8"?>
+<p:sld xmlns:a="http://schemas.openxmlformats.org/drawingml/2006/main" xmlns:r="http://schemas.openxmlformats.org/officeDocument/2006/relationships" xmlns:p="http://schemas.openxmlformats.org/presentationml/2006/main">
+  <p:cSld>
+    <p:spTree>
+      <p:nvGrpSpPr>
+        <p:cNvPr id="1" name=""/>
+        <p:cNvGrpSpPr/>
+        <p:nvPr/>
+      </p:nvGrpSpPr>
+      <p:grpSpPr>
+        <a:xfrm>
+          <a:off x="0" y="0"/>
+          <a:ext cx="0" cy="0"/>
+          <a:chOff x="0" y="0"/>
+          <a:chExt cx="0" cy="0"/>
+        </a:xfrm>
+      </p:grpSpPr>
+      <p:sp>
+        <p:nvSpPr>
+          <p:cNvPr id="2" name="Title 1">
+            <a:extLst>
+              <a:ext uri="{FF2B5EF4-FFF2-40B4-BE49-F238E27FC236}">
                 <a16:creationId xmlns:a16="http://schemas.microsoft.com/office/drawing/2014/main" id="{85F26A8C-AA50-421D-9339-222D819771C3}"/>
               </a:ext>
             </a:extLst>
@@ -6941,7 +7158,7 @@
 </p:sld>
 </file>
 
-<file path=ppt/slides/slide6.xml><?xml version="1.0" encoding="utf-8"?>
+<file path=ppt/slides/slide7.xml><?xml version="1.0" encoding="utf-8"?>
 <p:sld xmlns:a="http://schemas.openxmlformats.org/drawingml/2006/main" xmlns:r="http://schemas.openxmlformats.org/officeDocument/2006/relationships" xmlns:p="http://schemas.openxmlformats.org/presentationml/2006/main">
   <p:cSld>
     <p:spTree>
@@ -7031,7 +7248,7 @@
 </p:sld>
 </file>
 
-<file path=ppt/slides/slide7.xml><?xml version="1.0" encoding="utf-8"?>
+<file path=ppt/slides/slide8.xml><?xml version="1.0" encoding="utf-8"?>
 <p:sld xmlns:a="http://schemas.openxmlformats.org/drawingml/2006/main" xmlns:r="http://schemas.openxmlformats.org/officeDocument/2006/relationships" xmlns:p="http://schemas.openxmlformats.org/presentationml/2006/main">
   <p:cSld>
     <p:spTree>
@@ -7126,7 +7343,7 @@
 </p:sld>
 </file>
 
-<file path=ppt/slides/slide8.xml><?xml version="1.0" encoding="utf-8"?>
+<file path=ppt/slides/slide9.xml><?xml version="1.0" encoding="utf-8"?>
 <p:sld xmlns:a="http://schemas.openxmlformats.org/drawingml/2006/main" xmlns:r="http://schemas.openxmlformats.org/officeDocument/2006/relationships" xmlns:p="http://schemas.openxmlformats.org/presentationml/2006/main">
   <p:cSld>
     <p:spTree>

</xml_diff>